<commit_message>
Latest version of the PowerPoint to go along with the R script
</commit_message>
<xml_diff>
--- a/EEB698_Lyon_GuestLecture_ACTUAL.pptx
+++ b/EEB698_Lyon_GuestLecture_ACTUAL.pptx
@@ -224,7 +224,7 @@
           <a:p>
             <a:fld id="{CDA8A2FE-C469-FC4E-B9B9-8FF209A6C249}" type="datetimeFigureOut">
               <a:rPr lang="en-US" smtClean="0"/>
-              <a:t>11/12/18</a:t>
+              <a:t>11/14/18</a:t>
             </a:fld>
             <a:endParaRPr lang="en-US"/>
           </a:p>
@@ -390,7 +390,7 @@
           <a:p>
             <a:fld id="{BA0887ED-AB47-4D4D-8BAF-F3F971457EA0}" type="datetimeFigureOut">
               <a:rPr lang="en-US" smtClean="0"/>
-              <a:t>11/12/18</a:t>
+              <a:t>11/14/18</a:t>
             </a:fld>
             <a:endParaRPr lang="en-US"/>
           </a:p>
@@ -942,7 +942,7 @@
             <a:pPr algn="ctr" eaLnBrk="1" latinLnBrk="0" hangingPunct="1"/>
             <a:fld id="{42D66ED0-EE81-A44A-9726-3130B377C20F}" type="datetime1">
               <a:rPr lang="en-US" smtClean="0"/>
-              <a:t>11/12/18</a:t>
+              <a:t>11/14/18</a:t>
             </a:fld>
             <a:endParaRPr lang="en-US" sz="2000" dirty="0">
               <a:solidFill>
@@ -1128,7 +1128,7 @@
             <a:pPr eaLnBrk="1" latinLnBrk="0" hangingPunct="1"/>
             <a:fld id="{ED3C92BB-AC98-2445-AC18-63FFCFA5DB55}" type="datetime1">
               <a:rPr lang="en-US" smtClean="0"/>
-              <a:t>11/12/18</a:t>
+              <a:t>11/14/18</a:t>
             </a:fld>
             <a:endParaRPr lang="en-US"/>
           </a:p>
@@ -1295,7 +1295,7 @@
             <a:pPr eaLnBrk="1" latinLnBrk="0" hangingPunct="1"/>
             <a:fld id="{C322CB36-04C7-C44E-AD47-2A688AA6629F}" type="datetime1">
               <a:rPr lang="en-US" smtClean="0"/>
-              <a:t>11/12/18</a:t>
+              <a:t>11/14/18</a:t>
             </a:fld>
             <a:endParaRPr lang="en-US" dirty="0"/>
           </a:p>
@@ -1556,7 +1556,7 @@
             <a:pPr eaLnBrk="1" latinLnBrk="0" hangingPunct="1"/>
             <a:fld id="{5CE84AA0-24E8-0047-B8E6-A9DAA0C64AB6}" type="datetime1">
               <a:rPr lang="en-US" smtClean="0"/>
-              <a:t>11/12/18</a:t>
+              <a:t>11/14/18</a:t>
             </a:fld>
             <a:endParaRPr lang="en-US" dirty="0"/>
           </a:p>
@@ -1955,7 +1955,7 @@
             <a:pPr eaLnBrk="1" latinLnBrk="0" hangingPunct="1"/>
             <a:fld id="{638ADD7F-8437-814D-8D0D-8CD94BC74852}" type="datetime1">
               <a:rPr lang="en-US" smtClean="0"/>
-              <a:t>11/12/18</a:t>
+              <a:t>11/14/18</a:t>
             </a:fld>
             <a:endParaRPr lang="en-US"/>
           </a:p>
@@ -2168,7 +2168,7 @@
             <a:pPr eaLnBrk="1" latinLnBrk="0" hangingPunct="1"/>
             <a:fld id="{46930A6D-37D3-6A43-A130-14FC6565E093}" type="datetime1">
               <a:rPr lang="en-US" smtClean="0"/>
-              <a:t>11/12/18</a:t>
+              <a:t>11/14/18</a:t>
             </a:fld>
             <a:endParaRPr lang="en-US"/>
           </a:p>
@@ -2371,7 +2371,7 @@
             <a:pPr eaLnBrk="1" latinLnBrk="0" hangingPunct="1"/>
             <a:fld id="{FA40928A-E179-ED44-B545-912E83F828DC}" type="datetime1">
               <a:rPr lang="en-US" smtClean="0"/>
-              <a:t>11/12/18</a:t>
+              <a:t>11/14/18</a:t>
             </a:fld>
             <a:endParaRPr lang="en-US"/>
           </a:p>
@@ -2559,7 +2559,7 @@
             <a:pPr eaLnBrk="1" latinLnBrk="0" hangingPunct="1"/>
             <a:fld id="{DABE97BC-64CA-FF43-B479-52D0059C7824}" type="datetime1">
               <a:rPr lang="en-US" smtClean="0"/>
-              <a:t>11/12/18</a:t>
+              <a:t>11/14/18</a:t>
             </a:fld>
             <a:endParaRPr lang="en-US"/>
           </a:p>
@@ -2663,7 +2663,7 @@
             <a:pPr eaLnBrk="1" latinLnBrk="0" hangingPunct="1"/>
             <a:fld id="{D445857E-A0B8-6F4E-841F-91220E333F0A}" type="datetime1">
               <a:rPr lang="en-US" smtClean="0"/>
-              <a:t>11/12/18</a:t>
+              <a:t>11/14/18</a:t>
             </a:fld>
             <a:endParaRPr lang="en-US"/>
           </a:p>
@@ -2801,7 +2801,7 @@
             <a:pPr eaLnBrk="1" latinLnBrk="0" hangingPunct="1"/>
             <a:fld id="{C468AB6A-C180-AF43-8E15-8F1EDB8A472E}" type="datetime1">
               <a:rPr lang="en-US" smtClean="0"/>
-              <a:t>11/12/18</a:t>
+              <a:t>11/14/18</a:t>
             </a:fld>
             <a:endParaRPr lang="en-US"/>
           </a:p>
@@ -3299,7 +3299,7 @@
             <a:pPr eaLnBrk="1" latinLnBrk="0" hangingPunct="1"/>
             <a:fld id="{4014FB58-3113-6143-AC83-92D8B7762C3C}" type="datetime1">
               <a:rPr lang="en-US" smtClean="0"/>
-              <a:t>11/12/18</a:t>
+              <a:t>11/14/18</a:t>
             </a:fld>
             <a:endParaRPr lang="en-US"/>
           </a:p>
@@ -3557,7 +3557,7 @@
             <a:pPr eaLnBrk="1" latinLnBrk="0" hangingPunct="1"/>
             <a:fld id="{146E3902-9C25-9647-94CC-3CE1E25EFD54}" type="datetime1">
               <a:rPr lang="en-US" smtClean="0"/>
-              <a:t>11/12/18</a:t>
+              <a:t>11/14/18</a:t>
             </a:fld>
             <a:endParaRPr lang="en-US" sz="1400" dirty="0">
               <a:solidFill>

</xml_diff>

<commit_message>
Final commit of in-class changes. Hope this is helpful as a starting point for your own work in multivariate!
</commit_message>
<xml_diff>
--- a/EEB698_Lyon_GuestLecture_ACTUAL.pptx
+++ b/EEB698_Lyon_GuestLecture_ACTUAL.pptx
@@ -4985,7 +4985,7 @@
             <a:pPr lvl="1"/>
             <a:r>
               <a:rPr lang="en-US" dirty="0"/>
-              <a:t>Due to the variation maximization axes are ”constrained to orthogonality”</a:t>
+              <a:t>Due to the variation maximization, axes are ”constrained to orthogonality”</a:t>
             </a:r>
           </a:p>
           <a:p>
@@ -9890,6 +9890,104 @@
                                           </p:stCondLst>
                                         </p:cTn>
                                         <p:tgtEl>
+                                          <p:spTgt spid="11">
+                                            <p:txEl>
+                                              <p:pRg st="0" end="0"/>
+                                            </p:txEl>
+                                          </p:spTgt>
+                                        </p:tgtEl>
+                                        <p:attrNameLst>
+                                          <p:attrName>style.visibility</p:attrName>
+                                        </p:attrNameLst>
+                                      </p:cBhvr>
+                                      <p:to>
+                                        <p:strVal val="visible"/>
+                                      </p:to>
+                                    </p:set>
+                                  </p:childTnLst>
+                                </p:cTn>
+                              </p:par>
+                            </p:childTnLst>
+                          </p:cTn>
+                        </p:par>
+                      </p:childTnLst>
+                    </p:cTn>
+                  </p:par>
+                  <p:par>
+                    <p:cTn id="11" fill="hold">
+                      <p:stCondLst>
+                        <p:cond delay="indefinite"/>
+                      </p:stCondLst>
+                      <p:childTnLst>
+                        <p:par>
+                          <p:cTn id="12" fill="hold">
+                            <p:stCondLst>
+                              <p:cond delay="0"/>
+                            </p:stCondLst>
+                            <p:childTnLst>
+                              <p:par>
+                                <p:cTn id="13" presetID="1" presetClass="entr" presetSubtype="0" fill="hold" grpId="0" nodeType="clickEffect">
+                                  <p:stCondLst>
+                                    <p:cond delay="0"/>
+                                  </p:stCondLst>
+                                  <p:childTnLst>
+                                    <p:set>
+                                      <p:cBhvr>
+                                        <p:cTn id="14" dur="1" fill="hold">
+                                          <p:stCondLst>
+                                            <p:cond delay="0"/>
+                                          </p:stCondLst>
+                                        </p:cTn>
+                                        <p:tgtEl>
+                                          <p:spTgt spid="11">
+                                            <p:txEl>
+                                              <p:pRg st="1" end="1"/>
+                                            </p:txEl>
+                                          </p:spTgt>
+                                        </p:tgtEl>
+                                        <p:attrNameLst>
+                                          <p:attrName>style.visibility</p:attrName>
+                                        </p:attrNameLst>
+                                      </p:cBhvr>
+                                      <p:to>
+                                        <p:strVal val="visible"/>
+                                      </p:to>
+                                    </p:set>
+                                  </p:childTnLst>
+                                </p:cTn>
+                              </p:par>
+                            </p:childTnLst>
+                          </p:cTn>
+                        </p:par>
+                      </p:childTnLst>
+                    </p:cTn>
+                  </p:par>
+                  <p:par>
+                    <p:cTn id="15" fill="hold">
+                      <p:stCondLst>
+                        <p:cond delay="indefinite"/>
+                      </p:stCondLst>
+                      <p:childTnLst>
+                        <p:par>
+                          <p:cTn id="16" fill="hold">
+                            <p:stCondLst>
+                              <p:cond delay="0"/>
+                            </p:stCondLst>
+                            <p:childTnLst>
+                              <p:par>
+                                <p:cTn id="17" presetID="1" presetClass="entr" presetSubtype="0" fill="hold" grpId="0" nodeType="clickEffect">
+                                  <p:stCondLst>
+                                    <p:cond delay="0"/>
+                                  </p:stCondLst>
+                                  <p:childTnLst>
+                                    <p:set>
+                                      <p:cBhvr>
+                                        <p:cTn id="18" dur="1" fill="hold">
+                                          <p:stCondLst>
+                                            <p:cond delay="0"/>
+                                          </p:stCondLst>
+                                        </p:cTn>
+                                        <p:tgtEl>
                                           <p:spTgt spid="14"/>
                                         </p:tgtEl>
                                         <p:attrNameLst>
@@ -9931,6 +10029,7 @@
       </p:par>
     </p:tnLst>
     <p:bldLst>
+      <p:bldP spid="11" grpId="0" build="p"/>
       <p:bldP spid="14" grpId="0" animBg="1"/>
     </p:bldLst>
   </p:timing>

</xml_diff>